<commit_message>
Fix a bug in generation of loop type of roads
</commit_message>
<xml_diff>
--- a/doc/results_20140319/results_20140319.pptx
+++ b/doc/results_20140319/results_20140319.pptx
@@ -10,9 +10,7 @@
     <p:sldId id="261" r:id="rId4"/>
     <p:sldId id="268" r:id="rId5"/>
     <p:sldId id="265" r:id="rId6"/>
-    <p:sldId id="267" r:id="rId7"/>
-    <p:sldId id="263" r:id="rId8"/>
-    <p:sldId id="266" r:id="rId9"/>
+    <p:sldId id="263" r:id="rId7"/>
   </p:sldIdLst>
   <p:sldSz cx="9144000" cy="6858000" type="screen4x3"/>
   <p:notesSz cx="6997700" cy="9283700"/>
@@ -296,7 +294,7 @@
             <a:fld id="{1D8BD707-D9CF-40AE-B4C6-C98DA3205C09}" type="datetimeFigureOut">
               <a:rPr lang="en-US" smtClean="0"/>
               <a:pPr/>
-              <a:t>3/14/2014</a:t>
+              <a:t>3/19/2014</a:t>
             </a:fld>
             <a:endParaRPr lang="en-US"/>
           </a:p>
@@ -463,7 +461,7 @@
             <a:fld id="{1D8BD707-D9CF-40AE-B4C6-C98DA3205C09}" type="datetimeFigureOut">
               <a:rPr lang="en-US" smtClean="0"/>
               <a:pPr/>
-              <a:t>3/14/2014</a:t>
+              <a:t>3/19/2014</a:t>
             </a:fld>
             <a:endParaRPr lang="en-US"/>
           </a:p>
@@ -640,7 +638,7 @@
             <a:fld id="{1D8BD707-D9CF-40AE-B4C6-C98DA3205C09}" type="datetimeFigureOut">
               <a:rPr lang="en-US" smtClean="0"/>
               <a:pPr/>
-              <a:t>3/14/2014</a:t>
+              <a:t>3/19/2014</a:t>
             </a:fld>
             <a:endParaRPr lang="en-US"/>
           </a:p>
@@ -807,7 +805,7 @@
             <a:fld id="{1D8BD707-D9CF-40AE-B4C6-C98DA3205C09}" type="datetimeFigureOut">
               <a:rPr lang="en-US" smtClean="0"/>
               <a:pPr/>
-              <a:t>3/14/2014</a:t>
+              <a:t>3/19/2014</a:t>
             </a:fld>
             <a:endParaRPr lang="en-US"/>
           </a:p>
@@ -1050,7 +1048,7 @@
             <a:fld id="{1D8BD707-D9CF-40AE-B4C6-C98DA3205C09}" type="datetimeFigureOut">
               <a:rPr lang="en-US" smtClean="0"/>
               <a:pPr/>
-              <a:t>3/14/2014</a:t>
+              <a:t>3/19/2014</a:t>
             </a:fld>
             <a:endParaRPr lang="en-US"/>
           </a:p>
@@ -1335,7 +1333,7 @@
             <a:fld id="{1D8BD707-D9CF-40AE-B4C6-C98DA3205C09}" type="datetimeFigureOut">
               <a:rPr lang="en-US" smtClean="0"/>
               <a:pPr/>
-              <a:t>3/14/2014</a:t>
+              <a:t>3/19/2014</a:t>
             </a:fld>
             <a:endParaRPr lang="en-US"/>
           </a:p>
@@ -1754,7 +1752,7 @@
             <a:fld id="{1D8BD707-D9CF-40AE-B4C6-C98DA3205C09}" type="datetimeFigureOut">
               <a:rPr lang="en-US" smtClean="0"/>
               <a:pPr/>
-              <a:t>3/14/2014</a:t>
+              <a:t>3/19/2014</a:t>
             </a:fld>
             <a:endParaRPr lang="en-US"/>
           </a:p>
@@ -1869,7 +1867,7 @@
             <a:fld id="{1D8BD707-D9CF-40AE-B4C6-C98DA3205C09}" type="datetimeFigureOut">
               <a:rPr lang="en-US" smtClean="0"/>
               <a:pPr/>
-              <a:t>3/14/2014</a:t>
+              <a:t>3/19/2014</a:t>
             </a:fld>
             <a:endParaRPr lang="en-US"/>
           </a:p>
@@ -1961,7 +1959,7 @@
             <a:fld id="{1D8BD707-D9CF-40AE-B4C6-C98DA3205C09}" type="datetimeFigureOut">
               <a:rPr lang="en-US" smtClean="0"/>
               <a:pPr/>
-              <a:t>3/14/2014</a:t>
+              <a:t>3/19/2014</a:t>
             </a:fld>
             <a:endParaRPr lang="en-US"/>
           </a:p>
@@ -2235,7 +2233,7 @@
             <a:fld id="{1D8BD707-D9CF-40AE-B4C6-C98DA3205C09}" type="datetimeFigureOut">
               <a:rPr lang="en-US" smtClean="0"/>
               <a:pPr/>
-              <a:t>3/14/2014</a:t>
+              <a:t>3/19/2014</a:t>
             </a:fld>
             <a:endParaRPr lang="en-US"/>
           </a:p>
@@ -2485,7 +2483,7 @@
             <a:fld id="{1D8BD707-D9CF-40AE-B4C6-C98DA3205C09}" type="datetimeFigureOut">
               <a:rPr lang="en-US" smtClean="0"/>
               <a:pPr/>
-              <a:t>3/14/2014</a:t>
+              <a:t>3/19/2014</a:t>
             </a:fld>
             <a:endParaRPr lang="en-US"/>
           </a:p>
@@ -2695,7 +2693,7 @@
             <a:fld id="{1D8BD707-D9CF-40AE-B4C6-C98DA3205C09}" type="datetimeFigureOut">
               <a:rPr lang="en-US" smtClean="0"/>
               <a:pPr/>
-              <a:t>3/14/2014</a:t>
+              <a:t>3/19/2014</a:t>
             </a:fld>
             <a:endParaRPr lang="en-US"/>
           </a:p>
@@ -3151,7 +3149,7 @@
         <p:spPr>
           <a:xfrm>
             <a:off x="304800" y="609600"/>
-            <a:ext cx="8898590" cy="1384995"/>
+            <a:ext cx="4118307" cy="954107"/>
           </a:xfrm>
           <a:prstGeom prst="rect">
             <a:avLst/>
@@ -3179,93 +3177,27 @@
               <a:t>１．</a:t>
             </a:r>
             <a:r>
+              <a:rPr lang="en-US" altLang="ja-JP" sz="1400" dirty="0" smtClean="0"/>
+              <a:t>Street</a:t>
+            </a:r>
+            <a:r>
+              <a:rPr lang="ja-JP" altLang="en-US" sz="1400" dirty="0" smtClean="0"/>
+              <a:t>の特</a:t>
+            </a:r>
+            <a:r>
               <a:rPr lang="ja-JP" altLang="en-US" sz="1400" dirty="0"/>
-              <a:t>特徴</a:t>
+              <a:t>徴</a:t>
             </a:r>
             <a:r>
               <a:rPr lang="ja-JP" altLang="en-US" sz="1400" dirty="0" smtClean="0"/>
-              <a:t>量</a:t>
-            </a:r>
-            <a:r>
-              <a:rPr lang="ja-JP" altLang="en-US" sz="1400" dirty="0"/>
-              <a:t>に</a:t>
-            </a:r>
+              <a:t>量の抽出にバグがあったので修正。</a:t>
+            </a:r>
+            <a:endParaRPr lang="en-US" altLang="ja-JP" sz="1400" dirty="0" smtClean="0"/>
+          </a:p>
+          <a:p>
             <a:r>
               <a:rPr lang="ja-JP" altLang="en-US" sz="1400" dirty="0" smtClean="0"/>
-              <a:t>、レーン数を追加した。また、</a:t>
-            </a:r>
-            <a:r>
-              <a:rPr lang="en-US" altLang="ja-JP" sz="1400" dirty="0" smtClean="0"/>
-              <a:t>Local Street</a:t>
-            </a:r>
-            <a:r>
-              <a:rPr lang="ja-JP" altLang="en-US" sz="1400" dirty="0" smtClean="0"/>
-              <a:t>との交差点を</a:t>
-            </a:r>
-            <a:r>
-              <a:rPr lang="en-US" altLang="ja-JP" sz="1400" dirty="0" smtClean="0"/>
-              <a:t>Local Street</a:t>
-            </a:r>
-            <a:r>
-              <a:rPr lang="ja-JP" altLang="en-US" sz="1400" dirty="0" smtClean="0"/>
-              <a:t>生成用シードとして、特徴量に加えた。</a:t>
-            </a:r>
-            <a:endParaRPr lang="en-US" altLang="ja-JP" sz="1400" dirty="0" smtClean="0"/>
-          </a:p>
-          <a:p>
-            <a:r>
-              <a:rPr lang="ja-JP" altLang="en-US" sz="1400" dirty="0"/>
-              <a:t>　</a:t>
-            </a:r>
-            <a:r>
-              <a:rPr lang="ja-JP" altLang="en-US" sz="1400" dirty="0" smtClean="0"/>
-              <a:t>　⇒　やはり、</a:t>
-            </a:r>
-            <a:r>
-              <a:rPr lang="en-US" altLang="ja-JP" sz="1400" dirty="0" smtClean="0"/>
-              <a:t>Avenue</a:t>
-            </a:r>
-            <a:r>
-              <a:rPr lang="ja-JP" altLang="en-US" sz="1400" dirty="0" smtClean="0"/>
-              <a:t>のエッジを</a:t>
-            </a:r>
-            <a:r>
-              <a:rPr lang="en-US" altLang="ja-JP" sz="1400" dirty="0" smtClean="0"/>
-              <a:t>Local Street</a:t>
-            </a:r>
-            <a:r>
-              <a:rPr lang="ja-JP" altLang="en-US" sz="1400" dirty="0" smtClean="0"/>
-              <a:t>の交差点で分割すると、いろいろ問題が出てくるなぁ。</a:t>
-            </a:r>
-            <a:endParaRPr lang="en-US" altLang="ja-JP" sz="1400" dirty="0" smtClean="0"/>
-          </a:p>
-          <a:p>
-            <a:r>
-              <a:rPr lang="ja-JP" altLang="en-US" sz="1400" dirty="0"/>
-              <a:t>２</a:t>
-            </a:r>
-            <a:r>
-              <a:rPr lang="ja-JP" altLang="en-US" sz="1400" dirty="0" smtClean="0"/>
-              <a:t>．スナップ時に、</a:t>
-            </a:r>
-            <a:r>
-              <a:rPr lang="en-US" altLang="ja-JP" sz="1400" dirty="0" smtClean="0"/>
-              <a:t>intersect</a:t>
-            </a:r>
-            <a:r>
-              <a:rPr lang="ja-JP" altLang="en-US" sz="1400" dirty="0" smtClean="0"/>
-              <a:t>しないようにスナップするよう修正した。</a:t>
-            </a:r>
-            <a:endParaRPr lang="en-US" altLang="ja-JP" sz="1400" dirty="0" smtClean="0"/>
-          </a:p>
-          <a:p>
-            <a:r>
-              <a:rPr lang="ja-JP" altLang="en-US" sz="1400" dirty="0"/>
-              <a:t>　</a:t>
-            </a:r>
-            <a:r>
-              <a:rPr lang="ja-JP" altLang="en-US" sz="1400" dirty="0" smtClean="0"/>
-              <a:t>　⇒　このため、以前の結果と少し変わっているはず。</a:t>
+              <a:t>２．ループエッジの再生にバグがあったので修正。</a:t>
             </a:r>
             <a:endParaRPr lang="en-US" altLang="ja-JP" sz="1400" dirty="0" smtClean="0"/>
           </a:p>
@@ -3751,39 +3683,9 @@
           <a:chExt cx="0" cy="0"/>
         </a:xfrm>
       </p:grpSpPr>
-      <p:sp>
-        <p:nvSpPr>
-          <p:cNvPr id="3" name="TextBox 2"/>
-          <p:cNvSpPr txBox="1"/>
-          <p:nvPr/>
-        </p:nvSpPr>
-        <p:spPr>
-          <a:xfrm>
-            <a:off x="152400" y="152400"/>
-            <a:ext cx="5264390" cy="369332"/>
-          </a:xfrm>
-          <a:prstGeom prst="rect">
-            <a:avLst/>
-          </a:prstGeom>
-          <a:noFill/>
-        </p:spPr>
-        <p:txBody>
-          <a:bodyPr wrap="none" rtlCol="0">
-            <a:spAutoFit/>
-          </a:bodyPr>
-          <a:lstStyle/>
-          <a:p>
-            <a:r>
-              <a:rPr lang="en-US" dirty="0" smtClean="0"/>
-              <a:t>30x8,  No invasion check, Multi Seeds,  Weights: 1/1/0</a:t>
-            </a:r>
-            <a:endParaRPr lang="en-US" dirty="0"/>
-          </a:p>
-        </p:txBody>
-      </p:sp>
       <p:pic>
         <p:nvPicPr>
-          <p:cNvPr id="1026" name="Picture 2"/>
+          <p:cNvPr id="5123" name="Picture 3"/>
           <p:cNvPicPr>
             <a:picLocks noChangeAspect="1" noChangeArrowheads="1"/>
           </p:cNvPicPr>
@@ -3804,8 +3706,8 @@
         </p:blipFill>
         <p:spPr bwMode="auto">
           <a:xfrm>
-            <a:off x="1" y="983613"/>
-            <a:ext cx="9144000" cy="2445387"/>
+            <a:off x="1371600" y="609600"/>
+            <a:ext cx="6248400" cy="6087596"/>
           </a:xfrm>
           <a:prstGeom prst="rect">
             <a:avLst/>
@@ -3835,16 +3737,82 @@
           </a:extLst>
         </p:spPr>
       </p:pic>
+    </p:spTree>
+    <p:extLst>
+      <p:ext uri="{BB962C8B-B14F-4D97-AF65-F5344CB8AC3E}">
+        <p14:creationId xmlns:p14="http://schemas.microsoft.com/office/powerpoint/2010/main" val="3692937012"/>
+      </p:ext>
+    </p:extLst>
+  </p:cSld>
+  <p:clrMapOvr>
+    <a:masterClrMapping/>
+  </p:clrMapOvr>
+</p:sld>
+</file>
+
+<file path=ppt/slides/slide5.xml><?xml version="1.0" encoding="utf-8"?>
+<p:sld xmlns:a="http://schemas.openxmlformats.org/drawingml/2006/main" xmlns:r="http://schemas.openxmlformats.org/officeDocument/2006/relationships" xmlns:p="http://schemas.openxmlformats.org/presentationml/2006/main">
+  <p:cSld>
+    <p:spTree>
+      <p:nvGrpSpPr>
+        <p:cNvPr id="1" name=""/>
+        <p:cNvGrpSpPr/>
+        <p:nvPr/>
+      </p:nvGrpSpPr>
+      <p:grpSpPr>
+        <a:xfrm>
+          <a:off x="0" y="0"/>
+          <a:ext cx="0" cy="0"/>
+          <a:chOff x="0" y="0"/>
+          <a:chExt cx="0" cy="0"/>
+        </a:xfrm>
+      </p:grpSpPr>
+      <p:sp>
+        <p:nvSpPr>
+          <p:cNvPr id="2" name="TextBox 1"/>
+          <p:cNvSpPr txBox="1"/>
+          <p:nvPr/>
+        </p:nvSpPr>
+        <p:spPr>
+          <a:xfrm>
+            <a:off x="-1" y="5488"/>
+            <a:ext cx="3503588" cy="707886"/>
+          </a:xfrm>
+          <a:prstGeom prst="rect">
+            <a:avLst/>
+          </a:prstGeom>
+          <a:noFill/>
+        </p:spPr>
+        <p:txBody>
+          <a:bodyPr wrap="none" rtlCol="0">
+            <a:spAutoFit/>
+          </a:bodyPr>
+          <a:lstStyle/>
+          <a:p>
+            <a:r>
+              <a:rPr lang="en-US" sz="2000" dirty="0" smtClean="0"/>
+              <a:t>2. San Francisco</a:t>
+            </a:r>
+          </a:p>
+          <a:p>
+            <a:r>
+              <a:rPr lang="en-US" sz="2000" dirty="0" smtClean="0"/>
+              <a:t>kde_feature_san-francisco.xml</a:t>
+            </a:r>
+            <a:endParaRPr lang="en-US" sz="2000" dirty="0"/>
+          </a:p>
+        </p:txBody>
+      </p:sp>
       <p:pic>
         <p:nvPicPr>
-          <p:cNvPr id="2" name="Picture 2"/>
+          <p:cNvPr id="3" name="Picture 2"/>
           <p:cNvPicPr>
             <a:picLocks noChangeAspect="1" noChangeArrowheads="1"/>
           </p:cNvPicPr>
           <p:nvPr/>
         </p:nvPicPr>
         <p:blipFill>
-          <a:blip r:embed="rId3">
+          <a:blip r:embed="rId2">
             <a:extLst>
               <a:ext uri="{28A0092B-C50C-407E-A947-70E740481C1C}">
                 <a14:useLocalDpi xmlns:a14="http://schemas.microsoft.com/office/drawing/2010/main" val="0"/>
@@ -3858,8 +3826,8 @@
         </p:blipFill>
         <p:spPr bwMode="auto">
           <a:xfrm>
-            <a:off x="1" y="4158976"/>
-            <a:ext cx="9144000" cy="2470424"/>
+            <a:off x="1524000" y="1295400"/>
+            <a:ext cx="5853112" cy="5046916"/>
           </a:xfrm>
           <a:prstGeom prst="rect">
             <a:avLst/>
@@ -3889,260 +3857,6 @@
           </a:extLst>
         </p:spPr>
       </p:pic>
-      <p:sp>
-        <p:nvSpPr>
-          <p:cNvPr id="4" name="TextBox 3"/>
-          <p:cNvSpPr txBox="1"/>
-          <p:nvPr/>
-        </p:nvSpPr>
-        <p:spPr>
-          <a:xfrm>
-            <a:off x="-21565" y="661994"/>
-            <a:ext cx="2614818" cy="369332"/>
-          </a:xfrm>
-          <a:prstGeom prst="rect">
-            <a:avLst/>
-          </a:prstGeom>
-          <a:noFill/>
-        </p:spPr>
-        <p:txBody>
-          <a:bodyPr wrap="none" rtlCol="0">
-            <a:spAutoFit/>
-          </a:bodyPr>
-          <a:lstStyle/>
-          <a:p>
-            <a:r>
-              <a:rPr lang="ja-JP" altLang="en-US" dirty="0" smtClean="0"/>
-              <a:t>古い特徴量を使った場合</a:t>
-            </a:r>
-            <a:endParaRPr lang="en-US" dirty="0"/>
-          </a:p>
-        </p:txBody>
-      </p:sp>
-      <p:sp>
-        <p:nvSpPr>
-          <p:cNvPr id="6" name="TextBox 5"/>
-          <p:cNvSpPr txBox="1"/>
-          <p:nvPr/>
-        </p:nvSpPr>
-        <p:spPr>
-          <a:xfrm>
-            <a:off x="1" y="3821668"/>
-            <a:ext cx="2791149" cy="369332"/>
-          </a:xfrm>
-          <a:prstGeom prst="rect">
-            <a:avLst/>
-          </a:prstGeom>
-          <a:noFill/>
-        </p:spPr>
-        <p:txBody>
-          <a:bodyPr wrap="none" rtlCol="0">
-            <a:spAutoFit/>
-          </a:bodyPr>
-          <a:lstStyle/>
-          <a:p>
-            <a:r>
-              <a:rPr lang="ja-JP" altLang="en-US" dirty="0" smtClean="0"/>
-              <a:t>新しい特徴量を使った場合</a:t>
-            </a:r>
-            <a:endParaRPr lang="en-US" dirty="0"/>
-          </a:p>
-        </p:txBody>
-      </p:sp>
-      <p:sp>
-        <p:nvSpPr>
-          <p:cNvPr id="5" name="Oval 4"/>
-          <p:cNvSpPr/>
-          <p:nvPr/>
-        </p:nvSpPr>
-        <p:spPr>
-          <a:xfrm>
-            <a:off x="2514600" y="5791200"/>
-            <a:ext cx="609600" cy="457200"/>
-          </a:xfrm>
-          <a:prstGeom prst="ellipse">
-            <a:avLst/>
-          </a:prstGeom>
-          <a:noFill/>
-          <a:ln>
-            <a:prstDash val="dash"/>
-          </a:ln>
-        </p:spPr>
-        <p:style>
-          <a:lnRef idx="2">
-            <a:schemeClr val="accent1">
-              <a:shade val="50000"/>
-            </a:schemeClr>
-          </a:lnRef>
-          <a:fillRef idx="1">
-            <a:schemeClr val="accent1"/>
-          </a:fillRef>
-          <a:effectRef idx="0">
-            <a:schemeClr val="accent1"/>
-          </a:effectRef>
-          <a:fontRef idx="minor">
-            <a:schemeClr val="lt1"/>
-          </a:fontRef>
-        </p:style>
-        <p:txBody>
-          <a:bodyPr rtlCol="0" anchor="ctr"/>
-          <a:lstStyle/>
-          <a:p>
-            <a:pPr algn="ctr"/>
-            <a:endParaRPr lang="en-US"/>
-          </a:p>
-        </p:txBody>
-      </p:sp>
-      <p:sp>
-        <p:nvSpPr>
-          <p:cNvPr id="7" name="TextBox 6"/>
-          <p:cNvSpPr txBox="1"/>
-          <p:nvPr/>
-        </p:nvSpPr>
-        <p:spPr>
-          <a:xfrm>
-            <a:off x="3048000" y="5562600"/>
-            <a:ext cx="2924198" cy="369332"/>
-          </a:xfrm>
-          <a:prstGeom prst="rect">
-            <a:avLst/>
-          </a:prstGeom>
-          <a:noFill/>
-        </p:spPr>
-        <p:txBody>
-          <a:bodyPr wrap="none" rtlCol="0">
-            <a:spAutoFit/>
-          </a:bodyPr>
-          <a:lstStyle/>
-          <a:p>
-            <a:r>
-              <a:rPr lang="ja-JP" altLang="en-US" dirty="0" smtClean="0"/>
-              <a:t>カスケードキャンセルが必要</a:t>
-            </a:r>
-            <a:endParaRPr lang="en-US" dirty="0"/>
-          </a:p>
-        </p:txBody>
-      </p:sp>
-    </p:spTree>
-    <p:extLst>
-      <p:ext uri="{BB962C8B-B14F-4D97-AF65-F5344CB8AC3E}">
-        <p14:creationId xmlns:p14="http://schemas.microsoft.com/office/powerpoint/2010/main" val="1510778290"/>
-      </p:ext>
-    </p:extLst>
-  </p:cSld>
-  <p:clrMapOvr>
-    <a:masterClrMapping/>
-  </p:clrMapOvr>
-</p:sld>
-</file>
-
-<file path=ppt/slides/slide5.xml><?xml version="1.0" encoding="utf-8"?>
-<p:sld xmlns:a="http://schemas.openxmlformats.org/drawingml/2006/main" xmlns:r="http://schemas.openxmlformats.org/officeDocument/2006/relationships" xmlns:p="http://schemas.openxmlformats.org/presentationml/2006/main">
-  <p:cSld>
-    <p:spTree>
-      <p:nvGrpSpPr>
-        <p:cNvPr id="1" name=""/>
-        <p:cNvGrpSpPr/>
-        <p:nvPr/>
-      </p:nvGrpSpPr>
-      <p:grpSpPr>
-        <a:xfrm>
-          <a:off x="0" y="0"/>
-          <a:ext cx="0" cy="0"/>
-          <a:chOff x="0" y="0"/>
-          <a:chExt cx="0" cy="0"/>
-        </a:xfrm>
-      </p:grpSpPr>
-      <p:sp>
-        <p:nvSpPr>
-          <p:cNvPr id="2" name="TextBox 1"/>
-          <p:cNvSpPr txBox="1"/>
-          <p:nvPr/>
-        </p:nvSpPr>
-        <p:spPr>
-          <a:xfrm>
-            <a:off x="-1" y="5488"/>
-            <a:ext cx="3503588" cy="707886"/>
-          </a:xfrm>
-          <a:prstGeom prst="rect">
-            <a:avLst/>
-          </a:prstGeom>
-          <a:noFill/>
-        </p:spPr>
-        <p:txBody>
-          <a:bodyPr wrap="none" rtlCol="0">
-            <a:spAutoFit/>
-          </a:bodyPr>
-          <a:lstStyle/>
-          <a:p>
-            <a:r>
-              <a:rPr lang="en-US" sz="2000" dirty="0" smtClean="0"/>
-              <a:t>2. San Francisco</a:t>
-            </a:r>
-          </a:p>
-          <a:p>
-            <a:r>
-              <a:rPr lang="en-US" sz="2000" dirty="0" smtClean="0"/>
-              <a:t>kde_feature_san-francisco.xml</a:t>
-            </a:r>
-            <a:endParaRPr lang="en-US" sz="2000" dirty="0"/>
-          </a:p>
-        </p:txBody>
-      </p:sp>
-      <p:pic>
-        <p:nvPicPr>
-          <p:cNvPr id="3" name="Picture 2"/>
-          <p:cNvPicPr>
-            <a:picLocks noChangeAspect="1" noChangeArrowheads="1"/>
-          </p:cNvPicPr>
-          <p:nvPr/>
-        </p:nvPicPr>
-        <p:blipFill>
-          <a:blip r:embed="rId2">
-            <a:extLst>
-              <a:ext uri="{28A0092B-C50C-407E-A947-70E740481C1C}">
-                <a14:useLocalDpi xmlns:a14="http://schemas.microsoft.com/office/drawing/2010/main" val="0"/>
-              </a:ext>
-            </a:extLst>
-          </a:blip>
-          <a:srcRect/>
-          <a:stretch>
-            <a:fillRect/>
-          </a:stretch>
-        </p:blipFill>
-        <p:spPr bwMode="auto">
-          <a:xfrm>
-            <a:off x="1524000" y="1295400"/>
-            <a:ext cx="5853112" cy="5046916"/>
-          </a:xfrm>
-          <a:prstGeom prst="rect">
-            <a:avLst/>
-          </a:prstGeom>
-          <a:noFill/>
-          <a:ln>
-            <a:noFill/>
-          </a:ln>
-          <a:extLst>
-            <a:ext uri="{909E8E84-426E-40DD-AFC4-6F175D3DCCD1}">
-              <a14:hiddenFill xmlns:a14="http://schemas.microsoft.com/office/drawing/2010/main">
-                <a:solidFill>
-                  <a:schemeClr val="accent1"/>
-                </a:solidFill>
-              </a14:hiddenFill>
-            </a:ext>
-            <a:ext uri="{91240B29-F687-4F45-9708-019B960494DF}">
-              <a14:hiddenLine xmlns:a14="http://schemas.microsoft.com/office/drawing/2010/main" w="9525">
-                <a:solidFill>
-                  <a:schemeClr val="tx1"/>
-                </a:solidFill>
-                <a:miter lim="800000"/>
-                <a:headEnd/>
-                <a:tailEnd/>
-              </a14:hiddenLine>
-            </a:ext>
-          </a:extLst>
-        </p:spPr>
-      </p:pic>
     </p:spTree>
     <p:extLst>
       <p:ext uri="{BB962C8B-B14F-4D97-AF65-F5344CB8AC3E}">
@@ -4157,238 +3871,6 @@
 </file>
 
 <file path=ppt/slides/slide6.xml><?xml version="1.0" encoding="utf-8"?>
-<p:sld xmlns:a="http://schemas.openxmlformats.org/drawingml/2006/main" xmlns:r="http://schemas.openxmlformats.org/officeDocument/2006/relationships" xmlns:p="http://schemas.openxmlformats.org/presentationml/2006/main">
-  <p:cSld>
-    <p:spTree>
-      <p:nvGrpSpPr>
-        <p:cNvPr id="1" name=""/>
-        <p:cNvGrpSpPr/>
-        <p:nvPr/>
-      </p:nvGrpSpPr>
-      <p:grpSpPr>
-        <a:xfrm>
-          <a:off x="0" y="0"/>
-          <a:ext cx="0" cy="0"/>
-          <a:chOff x="0" y="0"/>
-          <a:chExt cx="0" cy="0"/>
-        </a:xfrm>
-      </p:grpSpPr>
-      <p:sp>
-        <p:nvSpPr>
-          <p:cNvPr id="3" name="TextBox 2"/>
-          <p:cNvSpPr txBox="1"/>
-          <p:nvPr/>
-        </p:nvSpPr>
-        <p:spPr>
-          <a:xfrm>
-            <a:off x="152400" y="152400"/>
-            <a:ext cx="5264390" cy="369332"/>
-          </a:xfrm>
-          <a:prstGeom prst="rect">
-            <a:avLst/>
-          </a:prstGeom>
-          <a:noFill/>
-        </p:spPr>
-        <p:txBody>
-          <a:bodyPr wrap="none" rtlCol="0">
-            <a:spAutoFit/>
-          </a:bodyPr>
-          <a:lstStyle/>
-          <a:p>
-            <a:r>
-              <a:rPr lang="en-US" dirty="0" smtClean="0"/>
-              <a:t>30x7,  No invasion check, Multi Seeds,  Weights: 1/1/0</a:t>
-            </a:r>
-            <a:endParaRPr lang="en-US" dirty="0"/>
-          </a:p>
-        </p:txBody>
-      </p:sp>
-      <p:pic>
-        <p:nvPicPr>
-          <p:cNvPr id="2" name="Picture 2"/>
-          <p:cNvPicPr>
-            <a:picLocks noChangeAspect="1" noChangeArrowheads="1"/>
-          </p:cNvPicPr>
-          <p:nvPr/>
-        </p:nvPicPr>
-        <p:blipFill>
-          <a:blip r:embed="rId2">
-            <a:extLst>
-              <a:ext uri="{28A0092B-C50C-407E-A947-70E740481C1C}">
-                <a14:useLocalDpi xmlns:a14="http://schemas.microsoft.com/office/drawing/2010/main" val="0"/>
-              </a:ext>
-            </a:extLst>
-          </a:blip>
-          <a:srcRect/>
-          <a:stretch>
-            <a:fillRect/>
-          </a:stretch>
-        </p:blipFill>
-        <p:spPr bwMode="auto">
-          <a:xfrm>
-            <a:off x="0" y="1066800"/>
-            <a:ext cx="9144000" cy="2154296"/>
-          </a:xfrm>
-          <a:prstGeom prst="rect">
-            <a:avLst/>
-          </a:prstGeom>
-          <a:noFill/>
-          <a:ln>
-            <a:noFill/>
-          </a:ln>
-          <a:extLst>
-            <a:ext uri="{909E8E84-426E-40DD-AFC4-6F175D3DCCD1}">
-              <a14:hiddenFill xmlns:a14="http://schemas.microsoft.com/office/drawing/2010/main">
-                <a:solidFill>
-                  <a:schemeClr val="accent1"/>
-                </a:solidFill>
-              </a14:hiddenFill>
-            </a:ext>
-            <a:ext uri="{91240B29-F687-4F45-9708-019B960494DF}">
-              <a14:hiddenLine xmlns:a14="http://schemas.microsoft.com/office/drawing/2010/main" w="9525">
-                <a:solidFill>
-                  <a:schemeClr val="tx1"/>
-                </a:solidFill>
-                <a:miter lim="800000"/>
-                <a:headEnd/>
-                <a:tailEnd/>
-              </a14:hiddenLine>
-            </a:ext>
-          </a:extLst>
-        </p:spPr>
-      </p:pic>
-      <p:pic>
-        <p:nvPicPr>
-          <p:cNvPr id="3075" name="Picture 3"/>
-          <p:cNvPicPr>
-            <a:picLocks noChangeAspect="1" noChangeArrowheads="1"/>
-          </p:cNvPicPr>
-          <p:nvPr/>
-        </p:nvPicPr>
-        <p:blipFill>
-          <a:blip r:embed="rId3">
-            <a:extLst>
-              <a:ext uri="{28A0092B-C50C-407E-A947-70E740481C1C}">
-                <a14:useLocalDpi xmlns:a14="http://schemas.microsoft.com/office/drawing/2010/main" val="0"/>
-              </a:ext>
-            </a:extLst>
-          </a:blip>
-          <a:srcRect/>
-          <a:stretch>
-            <a:fillRect/>
-          </a:stretch>
-        </p:blipFill>
-        <p:spPr bwMode="auto">
-          <a:xfrm>
-            <a:off x="-8965" y="4256134"/>
-            <a:ext cx="9152965" cy="2144665"/>
-          </a:xfrm>
-          <a:prstGeom prst="rect">
-            <a:avLst/>
-          </a:prstGeom>
-          <a:noFill/>
-          <a:ln>
-            <a:noFill/>
-          </a:ln>
-          <a:extLst>
-            <a:ext uri="{909E8E84-426E-40DD-AFC4-6F175D3DCCD1}">
-              <a14:hiddenFill xmlns:a14="http://schemas.microsoft.com/office/drawing/2010/main">
-                <a:solidFill>
-                  <a:schemeClr val="accent1"/>
-                </a:solidFill>
-              </a14:hiddenFill>
-            </a:ext>
-            <a:ext uri="{91240B29-F687-4F45-9708-019B960494DF}">
-              <a14:hiddenLine xmlns:a14="http://schemas.microsoft.com/office/drawing/2010/main" w="9525">
-                <a:solidFill>
-                  <a:schemeClr val="tx1"/>
-                </a:solidFill>
-                <a:miter lim="800000"/>
-                <a:headEnd/>
-                <a:tailEnd/>
-              </a14:hiddenLine>
-            </a:ext>
-          </a:extLst>
-        </p:spPr>
-      </p:pic>
-      <p:sp>
-        <p:nvSpPr>
-          <p:cNvPr id="6" name="TextBox 5"/>
-          <p:cNvSpPr txBox="1"/>
-          <p:nvPr/>
-        </p:nvSpPr>
-        <p:spPr>
-          <a:xfrm>
-            <a:off x="-21565" y="661994"/>
-            <a:ext cx="2614818" cy="369332"/>
-          </a:xfrm>
-          <a:prstGeom prst="rect">
-            <a:avLst/>
-          </a:prstGeom>
-          <a:noFill/>
-        </p:spPr>
-        <p:txBody>
-          <a:bodyPr wrap="none" rtlCol="0">
-            <a:spAutoFit/>
-          </a:bodyPr>
-          <a:lstStyle/>
-          <a:p>
-            <a:r>
-              <a:rPr lang="ja-JP" altLang="en-US" dirty="0" smtClean="0"/>
-              <a:t>古い特徴量を使った場合</a:t>
-            </a:r>
-            <a:endParaRPr lang="en-US" dirty="0"/>
-          </a:p>
-        </p:txBody>
-      </p:sp>
-      <p:sp>
-        <p:nvSpPr>
-          <p:cNvPr id="7" name="TextBox 6"/>
-          <p:cNvSpPr txBox="1"/>
-          <p:nvPr/>
-        </p:nvSpPr>
-        <p:spPr>
-          <a:xfrm>
-            <a:off x="1" y="3821668"/>
-            <a:ext cx="8933856" cy="369332"/>
-          </a:xfrm>
-          <a:prstGeom prst="rect">
-            <a:avLst/>
-          </a:prstGeom>
-          <a:noFill/>
-        </p:spPr>
-        <p:txBody>
-          <a:bodyPr wrap="none" rtlCol="0">
-            <a:spAutoFit/>
-          </a:bodyPr>
-          <a:lstStyle/>
-          <a:p>
-            <a:r>
-              <a:rPr lang="ja-JP" altLang="en-US" dirty="0" smtClean="0"/>
-              <a:t>新しい特徴量を使った</a:t>
-            </a:r>
-            <a:r>
-              <a:rPr lang="ja-JP" altLang="en-US" smtClean="0"/>
-              <a:t>場合（直線が多いので、今回の変更の影響をほとんど受けていない）</a:t>
-            </a:r>
-            <a:endParaRPr lang="en-US" dirty="0"/>
-          </a:p>
-        </p:txBody>
-      </p:sp>
-    </p:spTree>
-    <p:extLst>
-      <p:ext uri="{BB962C8B-B14F-4D97-AF65-F5344CB8AC3E}">
-        <p14:creationId xmlns:p14="http://schemas.microsoft.com/office/powerpoint/2010/main" val="369617972"/>
-      </p:ext>
-    </p:extLst>
-  </p:cSld>
-  <p:clrMapOvr>
-    <a:masterClrMapping/>
-  </p:clrMapOvr>
-</p:sld>
-</file>
-
-<file path=ppt/slides/slide7.xml><?xml version="1.0" encoding="utf-8"?>
 <p:sld xmlns:a="http://schemas.openxmlformats.org/drawingml/2006/main" xmlns:r="http://schemas.openxmlformats.org/officeDocument/2006/relationships" xmlns:p="http://schemas.openxmlformats.org/presentationml/2006/main">
   <p:cSld>
     <p:spTree>
@@ -5279,308 +4761,6 @@
     <p:extLst>
       <p:ext uri="{BB962C8B-B14F-4D97-AF65-F5344CB8AC3E}">
         <p14:creationId xmlns:p14="http://schemas.microsoft.com/office/powerpoint/2010/main" val="1718014354"/>
-      </p:ext>
-    </p:extLst>
-  </p:cSld>
-  <p:clrMapOvr>
-    <a:masterClrMapping/>
-  </p:clrMapOvr>
-</p:sld>
-</file>
-
-<file path=ppt/slides/slide8.xml><?xml version="1.0" encoding="utf-8"?>
-<p:sld xmlns:a="http://schemas.openxmlformats.org/drawingml/2006/main" xmlns:r="http://schemas.openxmlformats.org/officeDocument/2006/relationships" xmlns:p="http://schemas.openxmlformats.org/presentationml/2006/main">
-  <p:cSld>
-    <p:spTree>
-      <p:nvGrpSpPr>
-        <p:cNvPr id="1" name=""/>
-        <p:cNvGrpSpPr/>
-        <p:nvPr/>
-      </p:nvGrpSpPr>
-      <p:grpSpPr>
-        <a:xfrm>
-          <a:off x="0" y="0"/>
-          <a:ext cx="0" cy="0"/>
-          <a:chOff x="0" y="0"/>
-          <a:chExt cx="0" cy="0"/>
-        </a:xfrm>
-      </p:grpSpPr>
-      <p:sp>
-        <p:nvSpPr>
-          <p:cNvPr id="2" name="TextBox 1"/>
-          <p:cNvSpPr txBox="1"/>
-          <p:nvPr/>
-        </p:nvSpPr>
-        <p:spPr>
-          <a:xfrm>
-            <a:off x="152400" y="152400"/>
-            <a:ext cx="5264390" cy="369332"/>
-          </a:xfrm>
-          <a:prstGeom prst="rect">
-            <a:avLst/>
-          </a:prstGeom>
-          <a:noFill/>
-        </p:spPr>
-        <p:txBody>
-          <a:bodyPr wrap="none" rtlCol="0">
-            <a:spAutoFit/>
-          </a:bodyPr>
-          <a:lstStyle/>
-          <a:p>
-            <a:r>
-              <a:rPr lang="en-US" dirty="0" smtClean="0"/>
-              <a:t>20x6,  No invasion check, Multi Seeds,  Weights: 1/1/0</a:t>
-            </a:r>
-            <a:endParaRPr lang="en-US" dirty="0"/>
-          </a:p>
-        </p:txBody>
-      </p:sp>
-      <p:pic>
-        <p:nvPicPr>
-          <p:cNvPr id="3" name="Picture 2"/>
-          <p:cNvPicPr>
-            <a:picLocks noChangeAspect="1" noChangeArrowheads="1"/>
-          </p:cNvPicPr>
-          <p:nvPr/>
-        </p:nvPicPr>
-        <p:blipFill>
-          <a:blip r:embed="rId2">
-            <a:extLst>
-              <a:ext uri="{28A0092B-C50C-407E-A947-70E740481C1C}">
-                <a14:useLocalDpi xmlns:a14="http://schemas.microsoft.com/office/drawing/2010/main" val="0"/>
-              </a:ext>
-            </a:extLst>
-          </a:blip>
-          <a:srcRect/>
-          <a:stretch>
-            <a:fillRect/>
-          </a:stretch>
-        </p:blipFill>
-        <p:spPr bwMode="auto">
-          <a:xfrm>
-            <a:off x="35942" y="1066800"/>
-            <a:ext cx="9089409" cy="2743200"/>
-          </a:xfrm>
-          <a:prstGeom prst="rect">
-            <a:avLst/>
-          </a:prstGeom>
-          <a:noFill/>
-          <a:ln>
-            <a:noFill/>
-          </a:ln>
-          <a:extLst>
-            <a:ext uri="{909E8E84-426E-40DD-AFC4-6F175D3DCCD1}">
-              <a14:hiddenFill xmlns:a14="http://schemas.microsoft.com/office/drawing/2010/main">
-                <a:solidFill>
-                  <a:schemeClr val="accent1"/>
-                </a:solidFill>
-              </a14:hiddenFill>
-            </a:ext>
-            <a:ext uri="{91240B29-F687-4F45-9708-019B960494DF}">
-              <a14:hiddenLine xmlns:a14="http://schemas.microsoft.com/office/drawing/2010/main" w="9525">
-                <a:solidFill>
-                  <a:schemeClr val="tx1"/>
-                </a:solidFill>
-                <a:miter lim="800000"/>
-                <a:headEnd/>
-                <a:tailEnd/>
-              </a14:hiddenLine>
-            </a:ext>
-          </a:extLst>
-        </p:spPr>
-      </p:pic>
-      <p:sp>
-        <p:nvSpPr>
-          <p:cNvPr id="5" name="TextBox 4"/>
-          <p:cNvSpPr txBox="1"/>
-          <p:nvPr/>
-        </p:nvSpPr>
-        <p:spPr>
-          <a:xfrm>
-            <a:off x="-21565" y="661994"/>
-            <a:ext cx="2614818" cy="369332"/>
-          </a:xfrm>
-          <a:prstGeom prst="rect">
-            <a:avLst/>
-          </a:prstGeom>
-          <a:noFill/>
-        </p:spPr>
-        <p:txBody>
-          <a:bodyPr wrap="none" rtlCol="0">
-            <a:spAutoFit/>
-          </a:bodyPr>
-          <a:lstStyle/>
-          <a:p>
-            <a:r>
-              <a:rPr lang="ja-JP" altLang="en-US" dirty="0" smtClean="0"/>
-              <a:t>古い特徴量を使った場合</a:t>
-            </a:r>
-            <a:endParaRPr lang="en-US" dirty="0"/>
-          </a:p>
-        </p:txBody>
-      </p:sp>
-      <p:sp>
-        <p:nvSpPr>
-          <p:cNvPr id="6" name="TextBox 5"/>
-          <p:cNvSpPr txBox="1"/>
-          <p:nvPr/>
-        </p:nvSpPr>
-        <p:spPr>
-          <a:xfrm>
-            <a:off x="1" y="3821668"/>
-            <a:ext cx="2791149" cy="369332"/>
-          </a:xfrm>
-          <a:prstGeom prst="rect">
-            <a:avLst/>
-          </a:prstGeom>
-          <a:noFill/>
-        </p:spPr>
-        <p:txBody>
-          <a:bodyPr wrap="none" rtlCol="0">
-            <a:spAutoFit/>
-          </a:bodyPr>
-          <a:lstStyle/>
-          <a:p>
-            <a:r>
-              <a:rPr lang="ja-JP" altLang="en-US" dirty="0" smtClean="0"/>
-              <a:t>新しい特徴量を使った場合</a:t>
-            </a:r>
-            <a:endParaRPr lang="en-US" dirty="0"/>
-          </a:p>
-        </p:txBody>
-      </p:sp>
-      <p:pic>
-        <p:nvPicPr>
-          <p:cNvPr id="2051" name="Picture 3"/>
-          <p:cNvPicPr>
-            <a:picLocks noChangeAspect="1" noChangeArrowheads="1"/>
-          </p:cNvPicPr>
-          <p:nvPr/>
-        </p:nvPicPr>
-        <p:blipFill>
-          <a:blip r:embed="rId3">
-            <a:extLst>
-              <a:ext uri="{28A0092B-C50C-407E-A947-70E740481C1C}">
-                <a14:useLocalDpi xmlns:a14="http://schemas.microsoft.com/office/drawing/2010/main" val="0"/>
-              </a:ext>
-            </a:extLst>
-          </a:blip>
-          <a:srcRect/>
-          <a:stretch>
-            <a:fillRect/>
-          </a:stretch>
-        </p:blipFill>
-        <p:spPr bwMode="auto">
-          <a:xfrm>
-            <a:off x="-12600" y="4117179"/>
-            <a:ext cx="9156600" cy="2740821"/>
-          </a:xfrm>
-          <a:prstGeom prst="rect">
-            <a:avLst/>
-          </a:prstGeom>
-          <a:noFill/>
-          <a:ln>
-            <a:noFill/>
-          </a:ln>
-          <a:extLst>
-            <a:ext uri="{909E8E84-426E-40DD-AFC4-6F175D3DCCD1}">
-              <a14:hiddenFill xmlns:a14="http://schemas.microsoft.com/office/drawing/2010/main">
-                <a:solidFill>
-                  <a:schemeClr val="accent1"/>
-                </a:solidFill>
-              </a14:hiddenFill>
-            </a:ext>
-            <a:ext uri="{91240B29-F687-4F45-9708-019B960494DF}">
-              <a14:hiddenLine xmlns:a14="http://schemas.microsoft.com/office/drawing/2010/main" w="9525">
-                <a:solidFill>
-                  <a:schemeClr val="tx1"/>
-                </a:solidFill>
-                <a:miter lim="800000"/>
-                <a:headEnd/>
-                <a:tailEnd/>
-              </a14:hiddenLine>
-            </a:ext>
-          </a:extLst>
-        </p:spPr>
-      </p:pic>
-      <p:sp>
-        <p:nvSpPr>
-          <p:cNvPr id="8" name="Oval 7"/>
-          <p:cNvSpPr/>
-          <p:nvPr/>
-        </p:nvSpPr>
-        <p:spPr>
-          <a:xfrm>
-            <a:off x="2161548" y="5562600"/>
-            <a:ext cx="886452" cy="914400"/>
-          </a:xfrm>
-          <a:prstGeom prst="ellipse">
-            <a:avLst/>
-          </a:prstGeom>
-          <a:noFill/>
-          <a:ln>
-            <a:prstDash val="dash"/>
-          </a:ln>
-        </p:spPr>
-        <p:style>
-          <a:lnRef idx="2">
-            <a:schemeClr val="accent1">
-              <a:shade val="50000"/>
-            </a:schemeClr>
-          </a:lnRef>
-          <a:fillRef idx="1">
-            <a:schemeClr val="accent1"/>
-          </a:fillRef>
-          <a:effectRef idx="0">
-            <a:schemeClr val="accent1"/>
-          </a:effectRef>
-          <a:fontRef idx="minor">
-            <a:schemeClr val="lt1"/>
-          </a:fontRef>
-        </p:style>
-        <p:txBody>
-          <a:bodyPr rtlCol="0" anchor="ctr"/>
-          <a:lstStyle/>
-          <a:p>
-            <a:pPr algn="ctr"/>
-            <a:endParaRPr lang="en-US"/>
-          </a:p>
-        </p:txBody>
-      </p:sp>
-      <p:sp>
-        <p:nvSpPr>
-          <p:cNvPr id="9" name="TextBox 8"/>
-          <p:cNvSpPr txBox="1"/>
-          <p:nvPr/>
-        </p:nvSpPr>
-        <p:spPr>
-          <a:xfrm>
-            <a:off x="3008186" y="5302923"/>
-            <a:ext cx="1818126" cy="369332"/>
-          </a:xfrm>
-          <a:prstGeom prst="rect">
-            <a:avLst/>
-          </a:prstGeom>
-          <a:noFill/>
-        </p:spPr>
-        <p:txBody>
-          <a:bodyPr wrap="none" rtlCol="0">
-            <a:spAutoFit/>
-          </a:bodyPr>
-          <a:lstStyle/>
-          <a:p>
-            <a:r>
-              <a:rPr lang="ja-JP" altLang="en-US" dirty="0" smtClean="0"/>
-              <a:t>スナップしない？</a:t>
-            </a:r>
-            <a:endParaRPr lang="en-US" dirty="0"/>
-          </a:p>
-        </p:txBody>
-      </p:sp>
-    </p:spTree>
-    <p:extLst>
-      <p:ext uri="{BB962C8B-B14F-4D97-AF65-F5344CB8AC3E}">
-        <p14:creationId xmlns:p14="http://schemas.microsoft.com/office/powerpoint/2010/main" val="2661577249"/>
       </p:ext>
     </p:extLst>
   </p:cSld>

</xml_diff>